<commit_message>
acpt: add scenarios for DataLabel.position
* Update some legacy steps to current conventions
* Fix a few mis-labeled examples
</commit_message>
<xml_diff>
--- a/features/steps/test_files/cht-point-props.pptx
+++ b/features/steps/test_files/cht-point-props.pptx
@@ -6,6 +6,7 @@
   </p:sldMasterIdLst>
   <p:sldIdLst>
     <p:sldId id="256" r:id="rId2"/>
+    <p:sldId id="257" r:id="rId3"/>
   </p:sldIdLst>
   <p:sldSz cx="9144000" cy="6858000" type="screen4x3"/>
   <p:notesSz cx="6858000" cy="9144000"/>
@@ -233,11 +234,11 @@
           <c:showPercent val="0"/>
           <c:showBubbleSize val="0"/>
         </c:dLbls>
-        <c:axId val="-2042840840"/>
-        <c:axId val="-2115946728"/>
+        <c:axId val="2134006568"/>
+        <c:axId val="2134009624"/>
       </c:scatterChart>
       <c:valAx>
-        <c:axId val="-2042840840"/>
+        <c:axId val="2134006568"/>
         <c:scaling>
           <c:orientation val="minMax"/>
         </c:scaling>
@@ -247,12 +248,12 @@
         <c:majorTickMark val="out"/>
         <c:minorTickMark val="none"/>
         <c:tickLblPos val="nextTo"/>
-        <c:crossAx val="-2115946728"/>
+        <c:crossAx val="2134009624"/>
         <c:crosses val="autoZero"/>
         <c:crossBetween val="midCat"/>
       </c:valAx>
       <c:valAx>
-        <c:axId val="-2115946728"/>
+        <c:axId val="2134009624"/>
         <c:scaling>
           <c:orientation val="minMax"/>
         </c:scaling>
@@ -263,7 +264,187 @@
         <c:majorTickMark val="out"/>
         <c:minorTickMark val="none"/>
         <c:tickLblPos val="nextTo"/>
-        <c:crossAx val="-2042840840"/>
+        <c:crossAx val="2134006568"/>
+        <c:crosses val="autoZero"/>
+        <c:crossBetween val="midCat"/>
+      </c:valAx>
+    </c:plotArea>
+    <c:legend>
+      <c:legendPos val="r"/>
+      <c:layout/>
+      <c:overlay val="0"/>
+    </c:legend>
+    <c:plotVisOnly val="1"/>
+    <c:dispBlanksAs val="gap"/>
+    <c:showDLblsOverMax val="0"/>
+  </c:chart>
+  <c:txPr>
+    <a:bodyPr/>
+    <a:lstStyle/>
+    <a:p>
+      <a:pPr>
+        <a:defRPr sz="1800"/>
+      </a:pPr>
+      <a:endParaRPr lang="en-US"/>
+    </a:p>
+  </c:txPr>
+  <c:externalData r:id="rId1">
+    <c:autoUpdate val="0"/>
+  </c:externalData>
+</c:chartSpace>
+</file>
+
+<file path=ppt/charts/chart2.xml><?xml version="1.0" encoding="utf-8"?>
+<c:chartSpace xmlns:c="http://schemas.openxmlformats.org/drawingml/2006/chart" xmlns:a="http://schemas.openxmlformats.org/drawingml/2006/main" xmlns:r="http://schemas.openxmlformats.org/officeDocument/2006/relationships">
+  <c:date1904 val="0"/>
+  <c:lang val="en-US"/>
+  <c:roundedCorners val="0"/>
+  <mc:AlternateContent xmlns:mc="http://schemas.openxmlformats.org/markup-compatibility/2006">
+    <mc:Choice xmlns:c14="http://schemas.microsoft.com/office/drawing/2007/8/2/chart" Requires="c14">
+      <c14:style val="118"/>
+    </mc:Choice>
+    <mc:Fallback>
+      <c:style val="18"/>
+    </mc:Fallback>
+  </mc:AlternateContent>
+  <c:chart>
+    <c:title>
+      <c:layout/>
+      <c:overlay val="0"/>
+    </c:title>
+    <c:autoTitleDeleted val="0"/>
+    <c:plotArea>
+      <c:layout/>
+      <c:scatterChart>
+        <c:scatterStyle val="lineMarker"/>
+        <c:varyColors val="0"/>
+        <c:ser>
+          <c:idx val="0"/>
+          <c:order val="0"/>
+          <c:tx>
+            <c:strRef>
+              <c:f>Sheet1!$B$1</c:f>
+              <c:strCache>
+                <c:ptCount val="1"/>
+                <c:pt idx="0">
+                  <c:v>Y-Value 1</c:v>
+                </c:pt>
+              </c:strCache>
+            </c:strRef>
+          </c:tx>
+          <c:spPr>
+            <a:ln w="47625">
+              <a:noFill/>
+            </a:ln>
+          </c:spPr>
+          <c:dLbls>
+            <c:dLbl>
+              <c:idx val="1"/>
+              <c:layout/>
+              <c:dLblPos val="ctr"/>
+              <c:showLegendKey val="0"/>
+              <c:showVal val="1"/>
+              <c:showCatName val="0"/>
+              <c:showSerName val="0"/>
+              <c:showPercent val="0"/>
+              <c:showBubbleSize val="0"/>
+            </c:dLbl>
+            <c:dLbl>
+              <c:idx val="2"/>
+              <c:layout/>
+              <c:dLblPos val="b"/>
+              <c:showLegendKey val="0"/>
+              <c:showVal val="1"/>
+              <c:showCatName val="0"/>
+              <c:showSerName val="0"/>
+              <c:showPercent val="0"/>
+              <c:showBubbleSize val="0"/>
+            </c:dLbl>
+            <c:showLegendKey val="0"/>
+            <c:showVal val="1"/>
+            <c:showCatName val="0"/>
+            <c:showSerName val="0"/>
+            <c:showPercent val="0"/>
+            <c:showBubbleSize val="0"/>
+            <c:showLeaderLines val="0"/>
+          </c:dLbls>
+          <c:xVal>
+            <c:numRef>
+              <c:f>Sheet1!$A$2:$A$4</c:f>
+              <c:numCache>
+                <c:formatCode>General</c:formatCode>
+                <c:ptCount val="3"/>
+                <c:pt idx="0">
+                  <c:v>0.7</c:v>
+                </c:pt>
+                <c:pt idx="1">
+                  <c:v>1.8</c:v>
+                </c:pt>
+                <c:pt idx="2">
+                  <c:v>2.6</c:v>
+                </c:pt>
+              </c:numCache>
+            </c:numRef>
+          </c:xVal>
+          <c:yVal>
+            <c:numRef>
+              <c:f>Sheet1!$B$2:$B$4</c:f>
+              <c:numCache>
+                <c:formatCode>General</c:formatCode>
+                <c:ptCount val="3"/>
+                <c:pt idx="0">
+                  <c:v>2.7</c:v>
+                </c:pt>
+                <c:pt idx="1">
+                  <c:v>3.2</c:v>
+                </c:pt>
+                <c:pt idx="2">
+                  <c:v>0.8</c:v>
+                </c:pt>
+              </c:numCache>
+            </c:numRef>
+          </c:yVal>
+          <c:smooth val="0"/>
+        </c:ser>
+        <c:dLbls>
+          <c:showLegendKey val="0"/>
+          <c:showVal val="1"/>
+          <c:showCatName val="0"/>
+          <c:showSerName val="0"/>
+          <c:showPercent val="0"/>
+          <c:showBubbleSize val="0"/>
+        </c:dLbls>
+        <c:axId val="2098337496"/>
+        <c:axId val="2098334008"/>
+      </c:scatterChart>
+      <c:valAx>
+        <c:axId val="2098337496"/>
+        <c:scaling>
+          <c:orientation val="minMax"/>
+        </c:scaling>
+        <c:delete val="0"/>
+        <c:axPos val="b"/>
+        <c:numFmt formatCode="General" sourceLinked="1"/>
+        <c:majorTickMark val="out"/>
+        <c:minorTickMark val="none"/>
+        <c:tickLblPos val="nextTo"/>
+        <c:crossAx val="2098334008"/>
+        <c:crosses val="autoZero"/>
+        <c:crossBetween val="midCat"/>
+      </c:valAx>
+      <c:valAx>
+        <c:axId val="2098334008"/>
+        <c:scaling>
+          <c:orientation val="minMax"/>
+        </c:scaling>
+        <c:delete val="0"/>
+        <c:axPos val="l"/>
+        <c:majorGridlines/>
+        <c:numFmt formatCode="General" sourceLinked="1"/>
+        <c:majorTickMark val="out"/>
+        <c:minorTickMark val="none"/>
+        <c:tickLblPos val="nextTo"/>
+        <c:crossAx val="2098337496"/>
         <c:crosses val="autoZero"/>
         <c:crossBetween val="midCat"/>
       </c:valAx>
@@ -642,6 +823,58 @@
     <p:extLst>
       <p:ext uri="{BB962C8B-B14F-4D97-AF65-F5344CB8AC3E}">
         <p14:creationId xmlns:p14="http://schemas.microsoft.com/office/powerpoint/2010/main" val="4207333189"/>
+      </p:ext>
+    </p:extLst>
+  </p:cSld>
+  <p:clrMapOvr>
+    <a:masterClrMapping/>
+  </p:clrMapOvr>
+</p:sld>
+</file>
+
+<file path=ppt/slides/slide2.xml><?xml version="1.0" encoding="utf-8"?>
+<p:sld xmlns:a="http://schemas.openxmlformats.org/drawingml/2006/main" xmlns:r="http://schemas.openxmlformats.org/officeDocument/2006/relationships" xmlns:p="http://schemas.openxmlformats.org/presentationml/2006/main">
+  <p:cSld>
+    <p:spTree>
+      <p:nvGrpSpPr>
+        <p:cNvPr id="1" name=""/>
+        <p:cNvGrpSpPr/>
+        <p:nvPr/>
+      </p:nvGrpSpPr>
+      <p:grpSpPr>
+        <a:xfrm>
+          <a:off x="0" y="0"/>
+          <a:ext cx="0" cy="0"/>
+          <a:chOff x="0" y="0"/>
+          <a:chExt cx="0" cy="0"/>
+        </a:xfrm>
+      </p:grpSpPr>
+      <p:graphicFrame>
+        <p:nvGraphicFramePr>
+          <p:cNvPr id="2" name="Chart 1"/>
+          <p:cNvGraphicFramePr/>
+          <p:nvPr>
+            <p:extLst>
+              <p:ext uri="{D42A27DB-BD31-4B8C-83A1-F6EECF244321}">
+                <p14:modId xmlns:p14="http://schemas.microsoft.com/office/powerpoint/2010/main" val="3009909299"/>
+              </p:ext>
+            </p:extLst>
+          </p:nvPr>
+        </p:nvGraphicFramePr>
+        <p:xfrm>
+          <a:off x="1524000" y="1397000"/>
+          <a:ext cx="6096000" cy="4064000"/>
+        </p:xfrm>
+        <a:graphic>
+          <a:graphicData uri="http://schemas.openxmlformats.org/drawingml/2006/chart">
+            <c:chart xmlns:c="http://schemas.openxmlformats.org/drawingml/2006/chart" xmlns:r="http://schemas.openxmlformats.org/officeDocument/2006/relationships" r:id="rId2"/>
+          </a:graphicData>
+        </a:graphic>
+      </p:graphicFrame>
+    </p:spTree>
+    <p:extLst>
+      <p:ext uri="{BB962C8B-B14F-4D97-AF65-F5344CB8AC3E}">
+        <p14:creationId xmlns:p14="http://schemas.microsoft.com/office/powerpoint/2010/main" val="2650137182"/>
       </p:ext>
     </p:extLst>
   </p:cSld>

</xml_diff>

<commit_message>
acpt: add scenarios for DataLabel.font
</commit_message>
<xml_diff>
--- a/features/steps/test_files/cht-point-props.pptx
+++ b/features/steps/test_files/cht-point-props.pptx
@@ -7,6 +7,7 @@
   <p:sldIdLst>
     <p:sldId id="256" r:id="rId2"/>
     <p:sldId id="257" r:id="rId3"/>
+    <p:sldId id="258" r:id="rId4"/>
   </p:sldIdLst>
   <p:sldSz cx="9144000" cy="6858000" type="screen4x3"/>
   <p:notesSz cx="6858000" cy="9144000"/>
@@ -234,11 +235,11 @@
           <c:showPercent val="0"/>
           <c:showBubbleSize val="0"/>
         </c:dLbls>
-        <c:axId val="2134006568"/>
-        <c:axId val="2134009624"/>
+        <c:axId val="-2138645240"/>
+        <c:axId val="-2117404184"/>
       </c:scatterChart>
       <c:valAx>
-        <c:axId val="2134006568"/>
+        <c:axId val="-2138645240"/>
         <c:scaling>
           <c:orientation val="minMax"/>
         </c:scaling>
@@ -248,12 +249,12 @@
         <c:majorTickMark val="out"/>
         <c:minorTickMark val="none"/>
         <c:tickLblPos val="nextTo"/>
-        <c:crossAx val="2134009624"/>
+        <c:crossAx val="-2117404184"/>
         <c:crosses val="autoZero"/>
         <c:crossBetween val="midCat"/>
       </c:valAx>
       <c:valAx>
-        <c:axId val="2134009624"/>
+        <c:axId val="-2117404184"/>
         <c:scaling>
           <c:orientation val="minMax"/>
         </c:scaling>
@@ -264,7 +265,7 @@
         <c:majorTickMark val="out"/>
         <c:minorTickMark val="none"/>
         <c:tickLblPos val="nextTo"/>
-        <c:crossAx val="2134006568"/>
+        <c:crossAx val="-2138645240"/>
         <c:crosses val="autoZero"/>
         <c:crossBetween val="midCat"/>
       </c:valAx>
@@ -414,11 +415,11 @@
           <c:showPercent val="0"/>
           <c:showBubbleSize val="0"/>
         </c:dLbls>
-        <c:axId val="2098337496"/>
-        <c:axId val="2098334008"/>
+        <c:axId val="-2133879144"/>
+        <c:axId val="-2134096536"/>
       </c:scatterChart>
       <c:valAx>
-        <c:axId val="2098337496"/>
+        <c:axId val="-2133879144"/>
         <c:scaling>
           <c:orientation val="minMax"/>
         </c:scaling>
@@ -428,12 +429,12 @@
         <c:majorTickMark val="out"/>
         <c:minorTickMark val="none"/>
         <c:tickLblPos val="nextTo"/>
-        <c:crossAx val="2098334008"/>
+        <c:crossAx val="-2134096536"/>
         <c:crosses val="autoZero"/>
         <c:crossBetween val="midCat"/>
       </c:valAx>
       <c:valAx>
-        <c:axId val="2098334008"/>
+        <c:axId val="-2134096536"/>
         <c:scaling>
           <c:orientation val="minMax"/>
         </c:scaling>
@@ -444,9 +445,221 @@
         <c:majorTickMark val="out"/>
         <c:minorTickMark val="none"/>
         <c:tickLblPos val="nextTo"/>
-        <c:crossAx val="2098337496"/>
+        <c:crossAx val="-2133879144"/>
         <c:crosses val="autoZero"/>
         <c:crossBetween val="midCat"/>
+      </c:valAx>
+    </c:plotArea>
+    <c:legend>
+      <c:legendPos val="r"/>
+      <c:layout/>
+      <c:overlay val="0"/>
+    </c:legend>
+    <c:plotVisOnly val="1"/>
+    <c:dispBlanksAs val="gap"/>
+    <c:showDLblsOverMax val="0"/>
+  </c:chart>
+  <c:txPr>
+    <a:bodyPr/>
+    <a:lstStyle/>
+    <a:p>
+      <a:pPr>
+        <a:defRPr sz="1800"/>
+      </a:pPr>
+      <a:endParaRPr lang="en-US"/>
+    </a:p>
+  </c:txPr>
+  <c:externalData r:id="rId1">
+    <c:autoUpdate val="0"/>
+  </c:externalData>
+</c:chartSpace>
+</file>
+
+<file path=ppt/charts/chart3.xml><?xml version="1.0" encoding="utf-8"?>
+<c:chartSpace xmlns:c="http://schemas.openxmlformats.org/drawingml/2006/chart" xmlns:a="http://schemas.openxmlformats.org/drawingml/2006/main" xmlns:r="http://schemas.openxmlformats.org/officeDocument/2006/relationships">
+  <c:date1904 val="0"/>
+  <c:lang val="en-US"/>
+  <c:roundedCorners val="0"/>
+  <mc:AlternateContent xmlns:mc="http://schemas.openxmlformats.org/markup-compatibility/2006">
+    <mc:Choice xmlns:c14="http://schemas.microsoft.com/office/drawing/2007/8/2/chart" Requires="c14">
+      <c14:style val="118"/>
+    </mc:Choice>
+    <mc:Fallback>
+      <c:style val="18"/>
+    </mc:Fallback>
+  </mc:AlternateContent>
+  <c:chart>
+    <c:title>
+      <c:layout/>
+      <c:overlay val="0"/>
+    </c:title>
+    <c:autoTitleDeleted val="0"/>
+    <c:plotArea>
+      <c:layout/>
+      <c:barChart>
+        <c:barDir val="col"/>
+        <c:grouping val="clustered"/>
+        <c:varyColors val="0"/>
+        <c:ser>
+          <c:idx val="0"/>
+          <c:order val="0"/>
+          <c:tx>
+            <c:strRef>
+              <c:f>Sheet1!$B$1</c:f>
+              <c:strCache>
+                <c:ptCount val="1"/>
+                <c:pt idx="0">
+                  <c:v>Series 1</c:v>
+                </c:pt>
+              </c:strCache>
+            </c:strRef>
+          </c:tx>
+          <c:invertIfNegative val="0"/>
+          <c:dLbls>
+            <c:dLbl>
+              <c:idx val="0"/>
+              <c:spPr/>
+              <c:txPr>
+                <a:bodyPr/>
+                <a:lstStyle/>
+                <a:p>
+                  <a:pPr>
+                    <a:defRPr sz="2400" b="1" i="0">
+                      <a:solidFill>
+                        <a:srgbClr val="FF0000"/>
+                      </a:solidFill>
+                    </a:defRPr>
+                  </a:pPr>
+                  <a:endParaRPr lang="en-US"/>
+                </a:p>
+              </c:txPr>
+              <c:showLegendKey val="0"/>
+              <c:showVal val="1"/>
+              <c:showCatName val="0"/>
+              <c:showSerName val="0"/>
+              <c:showPercent val="0"/>
+              <c:showBubbleSize val="0"/>
+            </c:dLbl>
+            <c:dLbl>
+              <c:idx val="2"/>
+              <c:spPr>
+                <a:ln>
+                  <a:solidFill>
+                    <a:srgbClr val="008000"/>
+                  </a:solidFill>
+                </a:ln>
+              </c:spPr>
+              <c:txPr>
+                <a:bodyPr/>
+                <a:lstStyle/>
+                <a:p>
+                  <a:pPr>
+                    <a:defRPr/>
+                  </a:pPr>
+                  <a:endParaRPr lang="en-US"/>
+                </a:p>
+              </c:txPr>
+              <c:showLegendKey val="0"/>
+              <c:showVal val="1"/>
+              <c:showCatName val="0"/>
+              <c:showSerName val="0"/>
+              <c:showPercent val="0"/>
+              <c:showBubbleSize val="0"/>
+            </c:dLbl>
+            <c:showLegendKey val="0"/>
+            <c:showVal val="1"/>
+            <c:showCatName val="0"/>
+            <c:showSerName val="0"/>
+            <c:showPercent val="0"/>
+            <c:showBubbleSize val="0"/>
+            <c:showLeaderLines val="0"/>
+          </c:dLbls>
+          <c:cat>
+            <c:strRef>
+              <c:f>Sheet1!$A$2:$A$5</c:f>
+              <c:strCache>
+                <c:ptCount val="4"/>
+                <c:pt idx="0">
+                  <c:v>Category 1</c:v>
+                </c:pt>
+                <c:pt idx="1">
+                  <c:v>Category 2</c:v>
+                </c:pt>
+                <c:pt idx="2">
+                  <c:v>Category 3</c:v>
+                </c:pt>
+                <c:pt idx="3">
+                  <c:v>Category 4</c:v>
+                </c:pt>
+              </c:strCache>
+            </c:strRef>
+          </c:cat>
+          <c:val>
+            <c:numRef>
+              <c:f>Sheet1!$B$2:$B$5</c:f>
+              <c:numCache>
+                <c:formatCode>General</c:formatCode>
+                <c:ptCount val="4"/>
+                <c:pt idx="0">
+                  <c:v>4.3</c:v>
+                </c:pt>
+                <c:pt idx="1">
+                  <c:v>2.5</c:v>
+                </c:pt>
+                <c:pt idx="2">
+                  <c:v>3.5</c:v>
+                </c:pt>
+                <c:pt idx="3">
+                  <c:v>4.5</c:v>
+                </c:pt>
+              </c:numCache>
+            </c:numRef>
+          </c:val>
+        </c:ser>
+        <c:dLbls>
+          <c:showLegendKey val="0"/>
+          <c:showVal val="1"/>
+          <c:showCatName val="0"/>
+          <c:showSerName val="0"/>
+          <c:showPercent val="0"/>
+          <c:showBubbleSize val="0"/>
+        </c:dLbls>
+        <c:gapWidth val="150"/>
+        <c:axId val="-2134765608"/>
+        <c:axId val="-2136084872"/>
+      </c:barChart>
+      <c:catAx>
+        <c:axId val="-2134765608"/>
+        <c:scaling>
+          <c:orientation val="minMax"/>
+        </c:scaling>
+        <c:delete val="0"/>
+        <c:axPos val="b"/>
+        <c:majorTickMark val="out"/>
+        <c:minorTickMark val="none"/>
+        <c:tickLblPos val="nextTo"/>
+        <c:crossAx val="-2136084872"/>
+        <c:crosses val="autoZero"/>
+        <c:auto val="1"/>
+        <c:lblAlgn val="ctr"/>
+        <c:lblOffset val="100"/>
+        <c:noMultiLvlLbl val="0"/>
+      </c:catAx>
+      <c:valAx>
+        <c:axId val="-2136084872"/>
+        <c:scaling>
+          <c:orientation val="minMax"/>
+        </c:scaling>
+        <c:delete val="0"/>
+        <c:axPos val="l"/>
+        <c:majorGridlines/>
+        <c:numFmt formatCode="General" sourceLinked="1"/>
+        <c:majorTickMark val="out"/>
+        <c:minorTickMark val="none"/>
+        <c:tickLblPos val="nextTo"/>
+        <c:crossAx val="-2134765608"/>
+        <c:crosses val="autoZero"/>
+        <c:crossBetween val="between"/>
       </c:valAx>
     </c:plotArea>
     <c:legend>
@@ -875,6 +1088,58 @@
     <p:extLst>
       <p:ext uri="{BB962C8B-B14F-4D97-AF65-F5344CB8AC3E}">
         <p14:creationId xmlns:p14="http://schemas.microsoft.com/office/powerpoint/2010/main" val="2650137182"/>
+      </p:ext>
+    </p:extLst>
+  </p:cSld>
+  <p:clrMapOvr>
+    <a:masterClrMapping/>
+  </p:clrMapOvr>
+</p:sld>
+</file>
+
+<file path=ppt/slides/slide3.xml><?xml version="1.0" encoding="utf-8"?>
+<p:sld xmlns:a="http://schemas.openxmlformats.org/drawingml/2006/main" xmlns:r="http://schemas.openxmlformats.org/officeDocument/2006/relationships" xmlns:p="http://schemas.openxmlformats.org/presentationml/2006/main">
+  <p:cSld>
+    <p:spTree>
+      <p:nvGrpSpPr>
+        <p:cNvPr id="1" name=""/>
+        <p:cNvGrpSpPr/>
+        <p:nvPr/>
+      </p:nvGrpSpPr>
+      <p:grpSpPr>
+        <a:xfrm>
+          <a:off x="0" y="0"/>
+          <a:ext cx="0" cy="0"/>
+          <a:chOff x="0" y="0"/>
+          <a:chExt cx="0" cy="0"/>
+        </a:xfrm>
+      </p:grpSpPr>
+      <p:graphicFrame>
+        <p:nvGraphicFramePr>
+          <p:cNvPr id="2" name="Chart 1"/>
+          <p:cNvGraphicFramePr/>
+          <p:nvPr>
+            <p:extLst>
+              <p:ext uri="{D42A27DB-BD31-4B8C-83A1-F6EECF244321}">
+                <p14:modId xmlns:p14="http://schemas.microsoft.com/office/powerpoint/2010/main" val="1616233482"/>
+              </p:ext>
+            </p:extLst>
+          </p:nvPr>
+        </p:nvGraphicFramePr>
+        <p:xfrm>
+          <a:off x="1524000" y="1397000"/>
+          <a:ext cx="6096000" cy="4064000"/>
+        </p:xfrm>
+        <a:graphic>
+          <a:graphicData uri="http://schemas.openxmlformats.org/drawingml/2006/chart">
+            <c:chart xmlns:c="http://schemas.openxmlformats.org/drawingml/2006/chart" xmlns:r="http://schemas.openxmlformats.org/officeDocument/2006/relationships" r:id="rId2"/>
+          </a:graphicData>
+        </a:graphic>
+      </p:graphicFrame>
+    </p:spTree>
+    <p:extLst>
+      <p:ext uri="{BB962C8B-B14F-4D97-AF65-F5344CB8AC3E}">
+        <p14:creationId xmlns:p14="http://schemas.microsoft.com/office/powerpoint/2010/main" val="2202825975"/>
       </p:ext>
     </p:extLst>
   </p:cSld>

</xml_diff>